<commit_message>
Update sequence diagram "call mapping" to "call methods" from controller to logic
</commit_message>
<xml_diff>
--- a/images/typicalSequenceDiagram.pptx
+++ b/images/typicalSequenceDiagram.pptx
@@ -208,7 +208,7 @@
           <a:p>
             <a:fld id="{DC50A2AC-D691-437C-A69B-81ECFE08AD4B}" type="datetimeFigureOut">
               <a:rPr lang="en-SG" smtClean="0"/>
-              <a:t>8/11/18</a:t>
+              <a:t>9/9/2019</a:t>
             </a:fld>
             <a:endParaRPr lang="en-SG"/>
           </a:p>
@@ -745,7 +745,7 @@
             <a:fld id="{1D8BD707-D9CF-40AE-B4C6-C98DA3205C09}" type="datetimeFigureOut">
               <a:rPr lang="en-US" smtClean="0"/>
               <a:pPr/>
-              <a:t>11/8/18</a:t>
+              <a:t>9/9/2019</a:t>
             </a:fld>
             <a:endParaRPr lang="en-US"/>
           </a:p>
@@ -910,7 +910,7 @@
             <a:fld id="{1D8BD707-D9CF-40AE-B4C6-C98DA3205C09}" type="datetimeFigureOut">
               <a:rPr lang="en-US" smtClean="0"/>
               <a:pPr/>
-              <a:t>11/8/18</a:t>
+              <a:t>9/9/2019</a:t>
             </a:fld>
             <a:endParaRPr lang="en-US"/>
           </a:p>
@@ -1085,7 +1085,7 @@
             <a:fld id="{1D8BD707-D9CF-40AE-B4C6-C98DA3205C09}" type="datetimeFigureOut">
               <a:rPr lang="en-US" smtClean="0"/>
               <a:pPr/>
-              <a:t>11/8/18</a:t>
+              <a:t>9/9/2019</a:t>
             </a:fld>
             <a:endParaRPr lang="en-US"/>
           </a:p>
@@ -1250,7 +1250,7 @@
             <a:fld id="{1D8BD707-D9CF-40AE-B4C6-C98DA3205C09}" type="datetimeFigureOut">
               <a:rPr lang="en-US" smtClean="0"/>
               <a:pPr/>
-              <a:t>11/8/18</a:t>
+              <a:t>9/9/2019</a:t>
             </a:fld>
             <a:endParaRPr lang="en-US"/>
           </a:p>
@@ -1492,7 +1492,7 @@
             <a:fld id="{1D8BD707-D9CF-40AE-B4C6-C98DA3205C09}" type="datetimeFigureOut">
               <a:rPr lang="en-US" smtClean="0"/>
               <a:pPr/>
-              <a:t>11/8/18</a:t>
+              <a:t>9/9/2019</a:t>
             </a:fld>
             <a:endParaRPr lang="en-US"/>
           </a:p>
@@ -1774,7 +1774,7 @@
             <a:fld id="{1D8BD707-D9CF-40AE-B4C6-C98DA3205C09}" type="datetimeFigureOut">
               <a:rPr lang="en-US" smtClean="0"/>
               <a:pPr/>
-              <a:t>11/8/18</a:t>
+              <a:t>9/9/2019</a:t>
             </a:fld>
             <a:endParaRPr lang="en-US"/>
           </a:p>
@@ -2190,7 +2190,7 @@
             <a:fld id="{1D8BD707-D9CF-40AE-B4C6-C98DA3205C09}" type="datetimeFigureOut">
               <a:rPr lang="en-US" smtClean="0"/>
               <a:pPr/>
-              <a:t>11/8/18</a:t>
+              <a:t>9/9/2019</a:t>
             </a:fld>
             <a:endParaRPr lang="en-US"/>
           </a:p>
@@ -2304,7 +2304,7 @@
             <a:fld id="{1D8BD707-D9CF-40AE-B4C6-C98DA3205C09}" type="datetimeFigureOut">
               <a:rPr lang="en-US" smtClean="0"/>
               <a:pPr/>
-              <a:t>11/8/18</a:t>
+              <a:t>9/9/2019</a:t>
             </a:fld>
             <a:endParaRPr lang="en-US"/>
           </a:p>
@@ -2396,7 +2396,7 @@
             <a:fld id="{1D8BD707-D9CF-40AE-B4C6-C98DA3205C09}" type="datetimeFigureOut">
               <a:rPr lang="en-US" smtClean="0"/>
               <a:pPr/>
-              <a:t>11/8/18</a:t>
+              <a:t>9/9/2019</a:t>
             </a:fld>
             <a:endParaRPr lang="en-US"/>
           </a:p>
@@ -2668,7 +2668,7 @@
             <a:fld id="{1D8BD707-D9CF-40AE-B4C6-C98DA3205C09}" type="datetimeFigureOut">
               <a:rPr lang="en-US" smtClean="0"/>
               <a:pPr/>
-              <a:t>11/8/18</a:t>
+              <a:t>9/9/2019</a:t>
             </a:fld>
             <a:endParaRPr lang="en-US"/>
           </a:p>
@@ -2917,7 +2917,7 @@
             <a:fld id="{1D8BD707-D9CF-40AE-B4C6-C98DA3205C09}" type="datetimeFigureOut">
               <a:rPr lang="en-US" smtClean="0"/>
               <a:pPr/>
-              <a:t>11/8/18</a:t>
+              <a:t>9/9/2019</a:t>
             </a:fld>
             <a:endParaRPr lang="en-US"/>
           </a:p>
@@ -3125,7 +3125,7 @@
             <a:fld id="{1D8BD707-D9CF-40AE-B4C6-C98DA3205C09}" type="datetimeFigureOut">
               <a:rPr lang="en-US" smtClean="0"/>
               <a:pPr/>
-              <a:t>11/8/18</a:t>
+              <a:t>9/9/2019</a:t>
             </a:fld>
             <a:endParaRPr lang="en-US"/>
           </a:p>
@@ -5631,7 +5631,7 @@
         </p:nvSpPr>
         <p:spPr>
           <a:xfrm>
-            <a:off x="7435303" y="3008444"/>
+            <a:off x="7514577" y="3008444"/>
             <a:ext cx="1328592" cy="338554"/>
           </a:xfrm>
           <a:prstGeom prst="rect">
@@ -5665,7 +5665,7 @@
                   <a:srgbClr val="4F81BD"/>
                 </a:solidFill>
               </a:rPr>
-              <a:t>call mapping</a:t>
+              <a:t>Call methods</a:t>
             </a:r>
             <a:endParaRPr lang="en-SG" dirty="0">
               <a:solidFill>

</xml_diff>